<commit_message>
Again finished ppt  i docx
</commit_message>
<xml_diff>
--- a/docs/obrana/extreme-sports.pptx
+++ b/docs/obrana/extreme-sports.pptx
@@ -5,7 +5,7 @@
     <p:sldMasterId id="2147483870" r:id="rId1"/>
   </p:sldMasterIdLst>
   <p:notesMasterIdLst>
-    <p:notesMasterId r:id="rId30"/>
+    <p:notesMasterId r:id="rId31"/>
   </p:notesMasterIdLst>
   <p:sldIdLst>
     <p:sldId id="256" r:id="rId2"/>
@@ -32,10 +32,11 @@
     <p:sldId id="273" r:id="rId23"/>
     <p:sldId id="284" r:id="rId24"/>
     <p:sldId id="272" r:id="rId25"/>
-    <p:sldId id="285" r:id="rId26"/>
-    <p:sldId id="263" r:id="rId27"/>
+    <p:sldId id="263" r:id="rId26"/>
+    <p:sldId id="286" r:id="rId27"/>
     <p:sldId id="264" r:id="rId28"/>
-    <p:sldId id="259" r:id="rId29"/>
+    <p:sldId id="285" r:id="rId29"/>
+    <p:sldId id="259" r:id="rId30"/>
   </p:sldIdLst>
   <p:sldSz cx="12192000" cy="6858000"/>
   <p:notesSz cx="6858000" cy="9144000"/>
@@ -1061,7 +1062,91 @@
           <a:p>
             <a:fld id="{0F0CC5B3-74C0-4006-9F49-3B32F179954A}" type="slidenum">
               <a:rPr lang="hr-HR" smtClean="0"/>
-              <a:t>25</a:t>
+              <a:t>26</a:t>
+            </a:fld>
+            <a:endParaRPr lang="hr-HR"/>
+          </a:p>
+        </p:txBody>
+      </p:sp>
+    </p:spTree>
+    <p:extLst>
+      <p:ext uri="{BB962C8B-B14F-4D97-AF65-F5344CB8AC3E}">
+        <p14:creationId xmlns:p14="http://schemas.microsoft.com/office/powerpoint/2010/main" val="2327464513"/>
+      </p:ext>
+    </p:extLst>
+  </p:cSld>
+  <p:clrMapOvr>
+    <a:masterClrMapping/>
+  </p:clrMapOvr>
+</p:notes>
+</file>
+
+<file path=ppt/notesSlides/notesSlide16.xml><?xml version="1.0" encoding="utf-8"?>
+<p:notes xmlns:a="http://schemas.openxmlformats.org/drawingml/2006/main" xmlns:r="http://schemas.openxmlformats.org/officeDocument/2006/relationships" xmlns:p="http://schemas.openxmlformats.org/presentationml/2006/main">
+  <p:cSld>
+    <p:spTree>
+      <p:nvGrpSpPr>
+        <p:cNvPr id="1" name=""/>
+        <p:cNvGrpSpPr/>
+        <p:nvPr/>
+      </p:nvGrpSpPr>
+      <p:grpSpPr>
+        <a:xfrm>
+          <a:off x="0" y="0"/>
+          <a:ext cx="0" cy="0"/>
+          <a:chOff x="0" y="0"/>
+          <a:chExt cx="0" cy="0"/>
+        </a:xfrm>
+      </p:grpSpPr>
+      <p:sp>
+        <p:nvSpPr>
+          <p:cNvPr id="2" name="Rezervirano mjesto slike slajda 1"/>
+          <p:cNvSpPr>
+            <a:spLocks noGrp="1" noRot="1" noChangeAspect="1"/>
+          </p:cNvSpPr>
+          <p:nvPr>
+            <p:ph type="sldImg"/>
+          </p:nvPr>
+        </p:nvSpPr>
+        <p:spPr/>
+      </p:sp>
+      <p:sp>
+        <p:nvSpPr>
+          <p:cNvPr id="3" name="Rezervirano mjesto bilježaka 2"/>
+          <p:cNvSpPr>
+            <a:spLocks noGrp="1"/>
+          </p:cNvSpPr>
+          <p:nvPr>
+            <p:ph type="body" idx="1"/>
+          </p:nvPr>
+        </p:nvSpPr>
+        <p:spPr/>
+        <p:txBody>
+          <a:bodyPr/>
+          <a:lstStyle/>
+          <a:p>
+            <a:endParaRPr lang="hr-HR" dirty="0"/>
+          </a:p>
+        </p:txBody>
+      </p:sp>
+      <p:sp>
+        <p:nvSpPr>
+          <p:cNvPr id="4" name="Rezervirano mjesto broja slajda 3"/>
+          <p:cNvSpPr>
+            <a:spLocks noGrp="1"/>
+          </p:cNvSpPr>
+          <p:nvPr>
+            <p:ph type="sldNum" sz="quarter" idx="10"/>
+          </p:nvPr>
+        </p:nvSpPr>
+        <p:spPr/>
+        <p:txBody>
+          <a:bodyPr/>
+          <a:lstStyle/>
+          <a:p>
+            <a:fld id="{0F0CC5B3-74C0-4006-9F49-3B32F179954A}" type="slidenum">
+              <a:rPr lang="hr-HR" smtClean="0"/>
+              <a:t>28</a:t>
             </a:fld>
             <a:endParaRPr lang="hr-HR"/>
           </a:p>
@@ -6394,17 +6479,8 @@
               <a:rPr lang="hr-HR" dirty="0" smtClean="0">
                 <a:latin typeface="Coda" panose="020B0500000000000004" pitchFamily="34" charset="0"/>
               </a:rPr>
-              <a:t>Estetika i minimalistički </a:t>
-            </a:r>
-            <a:r>
-              <a:rPr lang="hr-HR" dirty="0" smtClean="0">
-                <a:latin typeface="Coda" panose="020B0500000000000004" pitchFamily="34" charset="0"/>
-              </a:rPr>
-              <a:t>dizajn</a:t>
-            </a:r>
-            <a:endParaRPr lang="hr-HR" dirty="0" smtClean="0">
-              <a:latin typeface="Coda" panose="020B0500000000000004" pitchFamily="34" charset="0"/>
-            </a:endParaRPr>
+              <a:t>Estetika i minimalistički dizajn</a:t>
+            </a:r>
           </a:p>
           <a:p>
             <a:pPr marL="514350" indent="-514350">
@@ -6846,17 +6922,8 @@
               <a:rPr lang="hr-HR" dirty="0" smtClean="0">
                 <a:latin typeface="Coda" panose="020B0500000000000004" pitchFamily="34" charset="0"/>
               </a:rPr>
-              <a:t>Estetika i minimalistički </a:t>
-            </a:r>
-            <a:r>
-              <a:rPr lang="hr-HR" dirty="0" smtClean="0">
-                <a:latin typeface="Coda" panose="020B0500000000000004" pitchFamily="34" charset="0"/>
-              </a:rPr>
-              <a:t>dizajn</a:t>
-            </a:r>
-            <a:endParaRPr lang="hr-HR" dirty="0" smtClean="0">
-              <a:latin typeface="Coda" panose="020B0500000000000004" pitchFamily="34" charset="0"/>
-            </a:endParaRPr>
+              <a:t>Estetika i minimalistički dizajn</a:t>
+            </a:r>
           </a:p>
           <a:p>
             <a:pPr marL="514350" indent="-514350">
@@ -7114,6 +7181,28 @@
           <a:xfrm>
             <a:off x="331730" y="146676"/>
             <a:ext cx="829010" cy="829010"/>
+          </a:xfrm>
+          <a:prstGeom prst="rect">
+            <a:avLst/>
+          </a:prstGeom>
+        </p:spPr>
+      </p:pic>
+      <p:pic>
+        <p:nvPicPr>
+          <p:cNvPr id="6" name="Picture 22"/>
+          <p:cNvPicPr/>
+          <p:nvPr/>
+        </p:nvPicPr>
+        <p:blipFill>
+          <a:blip r:embed="rId4"/>
+          <a:stretch>
+            <a:fillRect/>
+          </a:stretch>
+        </p:blipFill>
+        <p:spPr>
+          <a:xfrm>
+            <a:off x="3284220" y="3075940"/>
+            <a:ext cx="5623560" cy="706120"/>
           </a:xfrm>
           <a:prstGeom prst="rect">
             <a:avLst/>
@@ -7635,17 +7724,8 @@
               <a:rPr lang="hr-HR" dirty="0" smtClean="0">
                 <a:latin typeface="Coda" panose="020B0500000000000004" pitchFamily="34" charset="0"/>
               </a:rPr>
-              <a:t>Estetika i minimalistički </a:t>
-            </a:r>
-            <a:r>
-              <a:rPr lang="hr-HR" dirty="0" smtClean="0">
-                <a:latin typeface="Coda" panose="020B0500000000000004" pitchFamily="34" charset="0"/>
-              </a:rPr>
-              <a:t>dizajn</a:t>
-            </a:r>
-            <a:endParaRPr lang="hr-HR" dirty="0" smtClean="0">
-              <a:latin typeface="Coda" panose="020B0500000000000004" pitchFamily="34" charset="0"/>
-            </a:endParaRPr>
+              <a:t>Estetika i minimalistički dizajn</a:t>
+            </a:r>
           </a:p>
           <a:p>
             <a:pPr marL="514350" indent="-514350">
@@ -7928,6 +8008,28 @@
           </a:p>
         </p:txBody>
       </p:sp>
+      <p:pic>
+        <p:nvPicPr>
+          <p:cNvPr id="6" name="Picture 23"/>
+          <p:cNvPicPr/>
+          <p:nvPr/>
+        </p:nvPicPr>
+        <p:blipFill>
+          <a:blip r:embed="rId4"/>
+          <a:stretch>
+            <a:fillRect/>
+          </a:stretch>
+        </p:blipFill>
+        <p:spPr>
+          <a:xfrm>
+            <a:off x="0" y="336884"/>
+            <a:ext cx="12192000" cy="6543341"/>
+          </a:xfrm>
+          <a:prstGeom prst="rect">
+            <a:avLst/>
+          </a:prstGeom>
+        </p:spPr>
+      </p:pic>
     </p:spTree>
     <p:extLst>
       <p:ext uri="{BB962C8B-B14F-4D97-AF65-F5344CB8AC3E}">
@@ -8063,23 +8165,8 @@
                 </a:solidFill>
                 <a:latin typeface="Coda" panose="020B0500000000000004" pitchFamily="34" charset="0"/>
               </a:rPr>
-              <a:t>Estetika i minimalistički </a:t>
-            </a:r>
-            <a:r>
-              <a:rPr lang="hr-HR" dirty="0" smtClean="0">
-                <a:solidFill>
-                  <a:srgbClr val="FF5C01"/>
-                </a:solidFill>
-                <a:latin typeface="Coda" panose="020B0500000000000004" pitchFamily="34" charset="0"/>
-              </a:rPr>
-              <a:t>dizajn</a:t>
-            </a:r>
-            <a:endParaRPr lang="hr-HR" dirty="0" smtClean="0">
-              <a:solidFill>
-                <a:srgbClr val="FF5C01"/>
-              </a:solidFill>
-              <a:latin typeface="Coda" panose="020B0500000000000004" pitchFamily="34" charset="0"/>
-            </a:endParaRPr>
+              <a:t>Estetika i minimalistički dizajn</a:t>
+            </a:r>
           </a:p>
           <a:p>
             <a:pPr marL="514350" indent="-514350">
@@ -8343,25 +8430,28 @@
           </a:prstGeom>
         </p:spPr>
       </p:pic>
-      <p:sp>
-        <p:nvSpPr>
-          <p:cNvPr id="2" name="Rezervirano mjesto sadržaja 1"/>
-          <p:cNvSpPr>
-            <a:spLocks noGrp="1"/>
-          </p:cNvSpPr>
-          <p:nvPr>
-            <p:ph idx="1"/>
-          </p:nvPr>
-        </p:nvSpPr>
-        <p:spPr/>
-        <p:txBody>
-          <a:bodyPr/>
-          <a:lstStyle/>
-          <a:p>
-            <a:endParaRPr lang="hr-HR"/>
-          </a:p>
-        </p:txBody>
-      </p:sp>
+      <p:pic>
+        <p:nvPicPr>
+          <p:cNvPr id="6" name="Picture 28"/>
+          <p:cNvPicPr/>
+          <p:nvPr/>
+        </p:nvPicPr>
+        <p:blipFill>
+          <a:blip r:embed="rId4"/>
+          <a:stretch>
+            <a:fillRect/>
+          </a:stretch>
+        </p:blipFill>
+        <p:spPr>
+          <a:xfrm>
+            <a:off x="1303421" y="2032126"/>
+            <a:ext cx="9813758" cy="3810000"/>
+          </a:xfrm>
+          <a:prstGeom prst="rect">
+            <a:avLst/>
+          </a:prstGeom>
+        </p:spPr>
+      </p:pic>
     </p:spTree>
     <p:extLst>
       <p:ext uri="{BB962C8B-B14F-4D97-AF65-F5344CB8AC3E}">
@@ -8494,17 +8584,8 @@
               <a:rPr lang="hr-HR" dirty="0" smtClean="0">
                 <a:latin typeface="Coda" panose="020B0500000000000004" pitchFamily="34" charset="0"/>
               </a:rPr>
-              <a:t>Estetika i minimalistički </a:t>
-            </a:r>
-            <a:r>
-              <a:rPr lang="hr-HR" dirty="0" smtClean="0">
-                <a:latin typeface="Coda" panose="020B0500000000000004" pitchFamily="34" charset="0"/>
-              </a:rPr>
-              <a:t>dizajn</a:t>
-            </a:r>
-            <a:endParaRPr lang="hr-HR" dirty="0" smtClean="0">
-              <a:latin typeface="Coda" panose="020B0500000000000004" pitchFamily="34" charset="0"/>
-            </a:endParaRPr>
+              <a:t>Estetika i minimalistički dizajn</a:t>
+            </a:r>
           </a:p>
           <a:p>
             <a:pPr marL="514350" indent="-514350">
@@ -8703,6 +8784,94 @@
       </p:grpSpPr>
       <p:sp>
         <p:nvSpPr>
+          <p:cNvPr id="14" name="Rezervirano mjesto teksta 13"/>
+          <p:cNvSpPr>
+            <a:spLocks noGrp="1"/>
+          </p:cNvSpPr>
+          <p:nvPr>
+            <p:ph type="body" idx="1"/>
+          </p:nvPr>
+        </p:nvSpPr>
+        <p:spPr>
+          <a:xfrm>
+            <a:off x="839788" y="2757608"/>
+            <a:ext cx="5157787" cy="823912"/>
+          </a:xfrm>
+        </p:spPr>
+        <p:txBody>
+          <a:bodyPr>
+            <a:normAutofit/>
+          </a:bodyPr>
+          <a:lstStyle/>
+          <a:p>
+            <a:pPr marL="457200" indent="-457200">
+              <a:buClr>
+                <a:srgbClr val="0066CC"/>
+              </a:buClr>
+              <a:buFont typeface="+mj-lt"/>
+              <a:buAutoNum type="arabicPeriod"/>
+            </a:pPr>
+            <a:r>
+              <a:rPr lang="hr-HR" sz="2800" b="0" dirty="0" err="1" smtClean="0">
+                <a:latin typeface="Coda" panose="020B0500000000000004" pitchFamily="34" charset="0"/>
+              </a:rPr>
+              <a:t>Fittsov</a:t>
+            </a:r>
+            <a:r>
+              <a:rPr lang="hr-HR" sz="2800" b="0" dirty="0" smtClean="0">
+                <a:latin typeface="Coda" panose="020B0500000000000004" pitchFamily="34" charset="0"/>
+              </a:rPr>
+              <a:t> zakon</a:t>
+            </a:r>
+          </a:p>
+        </p:txBody>
+      </p:sp>
+      <p:sp>
+        <p:nvSpPr>
+          <p:cNvPr id="15" name="Rezervirano mjesto teksta 14"/>
+          <p:cNvSpPr>
+            <a:spLocks noGrp="1"/>
+          </p:cNvSpPr>
+          <p:nvPr>
+            <p:ph type="body" sz="quarter" idx="3"/>
+          </p:nvPr>
+        </p:nvSpPr>
+        <p:spPr>
+          <a:xfrm>
+            <a:off x="6172200" y="2757608"/>
+            <a:ext cx="5183188" cy="823912"/>
+          </a:xfrm>
+        </p:spPr>
+        <p:txBody>
+          <a:bodyPr>
+            <a:normAutofit/>
+          </a:bodyPr>
+          <a:lstStyle/>
+          <a:p>
+            <a:pPr marL="457200" indent="-457200">
+              <a:buClr>
+                <a:srgbClr val="0066CC"/>
+              </a:buClr>
+              <a:buFont typeface="+mj-lt"/>
+              <a:buAutoNum type="arabicPeriod" startAt="2"/>
+            </a:pPr>
+            <a:r>
+              <a:rPr lang="hr-HR" sz="2800" b="0" dirty="0" err="1" smtClean="0">
+                <a:latin typeface="Coda" panose="020B0500000000000004" pitchFamily="34" charset="0"/>
+              </a:rPr>
+              <a:t>Hickov</a:t>
+            </a:r>
+            <a:r>
+              <a:rPr lang="hr-HR" sz="2800" b="0" dirty="0" smtClean="0">
+                <a:latin typeface="Coda" panose="020B0500000000000004" pitchFamily="34" charset="0"/>
+              </a:rPr>
+              <a:t> zakon</a:t>
+            </a:r>
+          </a:p>
+        </p:txBody>
+      </p:sp>
+      <p:sp>
+        <p:nvSpPr>
           <p:cNvPr id="4" name="Pravokutnik 3"/>
           <p:cNvSpPr/>
           <p:nvPr/>
@@ -8753,7 +8922,7 @@
           <p:nvPr/>
         </p:nvPicPr>
         <p:blipFill>
-          <a:blip r:embed="rId3">
+          <a:blip r:embed="rId2">
             <a:extLst>
               <a:ext uri="{28A0092B-C50C-407E-A947-70E740481C1C}">
                 <a14:useLocalDpi xmlns:a14="http://schemas.microsoft.com/office/drawing/2010/main" val="0"/>
@@ -8776,27 +8945,96 @@
       </p:pic>
       <p:sp>
         <p:nvSpPr>
-          <p:cNvPr id="2" name="Rezervirano mjesto sadržaja 1"/>
-          <p:cNvSpPr>
-            <a:spLocks noGrp="1"/>
-          </p:cNvSpPr>
-          <p:nvPr>
-            <p:ph idx="1"/>
-          </p:nvPr>
-        </p:nvSpPr>
-        <p:spPr/>
-        <p:txBody>
-          <a:bodyPr/>
-          <a:lstStyle/>
-          <a:p>
-            <a:endParaRPr lang="hr-HR"/>
-          </a:p>
-        </p:txBody>
-      </p:sp>
+          <p:cNvPr id="6" name="Naslov 1"/>
+          <p:cNvSpPr txBox="1">
+            <a:spLocks/>
+          </p:cNvSpPr>
+          <p:nvPr/>
+        </p:nvSpPr>
+        <p:spPr>
+          <a:xfrm>
+            <a:off x="838200" y="1538989"/>
+            <a:ext cx="10515600" cy="1325563"/>
+          </a:xfrm>
+          <a:prstGeom prst="rect">
+            <a:avLst/>
+          </a:prstGeom>
+        </p:spPr>
+        <p:txBody>
+          <a:bodyPr vert="horz" lIns="91440" tIns="45720" rIns="91440" bIns="45720" rtlCol="0" anchor="ctr">
+            <a:normAutofit/>
+          </a:bodyPr>
+          <a:lstStyle>
+            <a:lvl1pPr algn="l" defTabSz="914400" rtl="0" eaLnBrk="1" latinLnBrk="0" hangingPunct="1">
+              <a:lnSpc>
+                <a:spcPct val="90000"/>
+              </a:lnSpc>
+              <a:spcBef>
+                <a:spcPct val="0"/>
+              </a:spcBef>
+              <a:buNone/>
+              <a:defRPr sz="4400" kern="1200">
+                <a:solidFill>
+                  <a:schemeClr val="tx1"/>
+                </a:solidFill>
+                <a:latin typeface="+mj-lt"/>
+                <a:ea typeface="+mj-ea"/>
+                <a:cs typeface="+mj-cs"/>
+              </a:defRPr>
+            </a:lvl1pPr>
+          </a:lstStyle>
+          <a:p>
+            <a:r>
+              <a:rPr lang="hr-HR" dirty="0" smtClean="0">
+                <a:solidFill>
+                  <a:srgbClr val="0066CC"/>
+                </a:solidFill>
+                <a:latin typeface="Coda" panose="020B0500000000000004" pitchFamily="34" charset="0"/>
+              </a:rPr>
+              <a:t>Teorije niske razine</a:t>
+            </a:r>
+            <a:endParaRPr lang="hr-HR" dirty="0">
+              <a:solidFill>
+                <a:srgbClr val="0066CC"/>
+              </a:solidFill>
+              <a:latin typeface="Coda" panose="020B0500000000000004" pitchFamily="34" charset="0"/>
+            </a:endParaRPr>
+          </a:p>
+        </p:txBody>
+      </p:sp>
+      <p:pic>
+        <p:nvPicPr>
+          <p:cNvPr id="9" name="Slika 8"/>
+          <p:cNvPicPr/>
+          <p:nvPr/>
+        </p:nvPicPr>
+        <p:blipFill rotWithShape="1">
+          <a:blip r:embed="rId3"/>
+          <a:srcRect l="40049" t="55208" r="52589" b="39951"/>
+          <a:stretch/>
+        </p:blipFill>
+        <p:spPr bwMode="auto">
+          <a:xfrm>
+            <a:off x="1160740" y="4195405"/>
+            <a:ext cx="2897506" cy="1209468"/>
+          </a:xfrm>
+          <a:prstGeom prst="rect">
+            <a:avLst/>
+          </a:prstGeom>
+          <a:ln>
+            <a:noFill/>
+          </a:ln>
+          <a:extLst>
+            <a:ext uri="{53640926-AAD7-44D8-BBD7-CCE9431645EC}">
+              <a14:shadowObscured xmlns:a14="http://schemas.microsoft.com/office/drawing/2010/main"/>
+            </a:ext>
+          </a:extLst>
+        </p:spPr>
+      </p:pic>
     </p:spTree>
     <p:extLst>
       <p:ext uri="{BB962C8B-B14F-4D97-AF65-F5344CB8AC3E}">
-        <p14:creationId xmlns:p14="http://schemas.microsoft.com/office/powerpoint/2010/main" val="1771570508"/>
+        <p14:creationId xmlns:p14="http://schemas.microsoft.com/office/powerpoint/2010/main" val="3642831469"/>
       </p:ext>
     </p:extLst>
   </p:cSld>
@@ -8832,94 +9070,6 @@
       </p:grpSpPr>
       <p:sp>
         <p:nvSpPr>
-          <p:cNvPr id="14" name="Rezervirano mjesto teksta 13"/>
-          <p:cNvSpPr>
-            <a:spLocks noGrp="1"/>
-          </p:cNvSpPr>
-          <p:nvPr>
-            <p:ph type="body" idx="1"/>
-          </p:nvPr>
-        </p:nvSpPr>
-        <p:spPr>
-          <a:xfrm>
-            <a:off x="839788" y="2757608"/>
-            <a:ext cx="5157787" cy="823912"/>
-          </a:xfrm>
-        </p:spPr>
-        <p:txBody>
-          <a:bodyPr>
-            <a:normAutofit/>
-          </a:bodyPr>
-          <a:lstStyle/>
-          <a:p>
-            <a:pPr marL="457200" indent="-457200">
-              <a:buClr>
-                <a:srgbClr val="0066CC"/>
-              </a:buClr>
-              <a:buFont typeface="+mj-lt"/>
-              <a:buAutoNum type="arabicPeriod"/>
-            </a:pPr>
-            <a:r>
-              <a:rPr lang="hr-HR" sz="2800" b="0" dirty="0" err="1" smtClean="0">
-                <a:latin typeface="Coda" panose="020B0500000000000004" pitchFamily="34" charset="0"/>
-              </a:rPr>
-              <a:t>Fittsov</a:t>
-            </a:r>
-            <a:r>
-              <a:rPr lang="hr-HR" sz="2800" b="0" dirty="0" smtClean="0">
-                <a:latin typeface="Coda" panose="020B0500000000000004" pitchFamily="34" charset="0"/>
-              </a:rPr>
-              <a:t> zakon</a:t>
-            </a:r>
-          </a:p>
-        </p:txBody>
-      </p:sp>
-      <p:sp>
-        <p:nvSpPr>
-          <p:cNvPr id="15" name="Rezervirano mjesto teksta 14"/>
-          <p:cNvSpPr>
-            <a:spLocks noGrp="1"/>
-          </p:cNvSpPr>
-          <p:nvPr>
-            <p:ph type="body" sz="quarter" idx="3"/>
-          </p:nvPr>
-        </p:nvSpPr>
-        <p:spPr>
-          <a:xfrm>
-            <a:off x="6172200" y="2757608"/>
-            <a:ext cx="5183188" cy="823912"/>
-          </a:xfrm>
-        </p:spPr>
-        <p:txBody>
-          <a:bodyPr>
-            <a:normAutofit/>
-          </a:bodyPr>
-          <a:lstStyle/>
-          <a:p>
-            <a:pPr marL="457200" indent="-457200">
-              <a:buClr>
-                <a:srgbClr val="0066CC"/>
-              </a:buClr>
-              <a:buFont typeface="+mj-lt"/>
-              <a:buAutoNum type="arabicPeriod" startAt="2"/>
-            </a:pPr>
-            <a:r>
-              <a:rPr lang="hr-HR" sz="2800" b="0" dirty="0" err="1" smtClean="0">
-                <a:latin typeface="Coda" panose="020B0500000000000004" pitchFamily="34" charset="0"/>
-              </a:rPr>
-              <a:t>Hickov</a:t>
-            </a:r>
-            <a:r>
-              <a:rPr lang="hr-HR" sz="2800" b="0" dirty="0" smtClean="0">
-                <a:latin typeface="Coda" panose="020B0500000000000004" pitchFamily="34" charset="0"/>
-              </a:rPr>
-              <a:t> zakon</a:t>
-            </a:r>
-          </a:p>
-        </p:txBody>
-      </p:sp>
-      <p:sp>
-        <p:nvSpPr>
           <p:cNvPr id="4" name="Pravokutnik 3"/>
           <p:cNvSpPr/>
           <p:nvPr/>
@@ -8970,7 +9120,7 @@
           <p:nvPr/>
         </p:nvPicPr>
         <p:blipFill>
-          <a:blip r:embed="rId2">
+          <a:blip r:embed="rId3">
             <a:extLst>
               <a:ext uri="{28A0092B-C50C-407E-A947-70E740481C1C}">
                 <a14:useLocalDpi xmlns:a14="http://schemas.microsoft.com/office/drawing/2010/main" val="0"/>
@@ -8993,96 +9143,49 @@
       </p:pic>
       <p:sp>
         <p:nvSpPr>
-          <p:cNvPr id="6" name="Naslov 1"/>
-          <p:cNvSpPr txBox="1">
-            <a:spLocks/>
-          </p:cNvSpPr>
+          <p:cNvPr id="2" name="Rezervirano mjesto sadržaja 1"/>
+          <p:cNvSpPr>
+            <a:spLocks noGrp="1"/>
+          </p:cNvSpPr>
+          <p:nvPr>
+            <p:ph idx="1"/>
+          </p:nvPr>
+        </p:nvSpPr>
+        <p:spPr/>
+        <p:txBody>
+          <a:bodyPr/>
+          <a:lstStyle/>
+          <a:p>
+            <a:endParaRPr lang="hr-HR"/>
+          </a:p>
+        </p:txBody>
+      </p:sp>
+      <p:pic>
+        <p:nvPicPr>
+          <p:cNvPr id="6" name="Picture 23"/>
+          <p:cNvPicPr/>
           <p:nvPr/>
-        </p:nvSpPr>
-        <p:spPr>
-          <a:xfrm>
-            <a:off x="838200" y="1538989"/>
-            <a:ext cx="10515600" cy="1325563"/>
+        </p:nvPicPr>
+        <p:blipFill>
+          <a:blip r:embed="rId4"/>
+          <a:stretch>
+            <a:fillRect/>
+          </a:stretch>
+        </p:blipFill>
+        <p:spPr>
+          <a:xfrm>
+            <a:off x="0" y="336884"/>
+            <a:ext cx="12192000" cy="6543341"/>
           </a:xfrm>
           <a:prstGeom prst="rect">
             <a:avLst/>
           </a:prstGeom>
-        </p:spPr>
-        <p:txBody>
-          <a:bodyPr vert="horz" lIns="91440" tIns="45720" rIns="91440" bIns="45720" rtlCol="0" anchor="ctr">
-            <a:normAutofit/>
-          </a:bodyPr>
-          <a:lstStyle>
-            <a:lvl1pPr algn="l" defTabSz="914400" rtl="0" eaLnBrk="1" latinLnBrk="0" hangingPunct="1">
-              <a:lnSpc>
-                <a:spcPct val="90000"/>
-              </a:lnSpc>
-              <a:spcBef>
-                <a:spcPct val="0"/>
-              </a:spcBef>
-              <a:buNone/>
-              <a:defRPr sz="4400" kern="1200">
-                <a:solidFill>
-                  <a:schemeClr val="tx1"/>
-                </a:solidFill>
-                <a:latin typeface="+mj-lt"/>
-                <a:ea typeface="+mj-ea"/>
-                <a:cs typeface="+mj-cs"/>
-              </a:defRPr>
-            </a:lvl1pPr>
-          </a:lstStyle>
-          <a:p>
-            <a:r>
-              <a:rPr lang="hr-HR" dirty="0" smtClean="0">
-                <a:solidFill>
-                  <a:srgbClr val="0066CC"/>
-                </a:solidFill>
-                <a:latin typeface="Coda" panose="020B0500000000000004" pitchFamily="34" charset="0"/>
-              </a:rPr>
-              <a:t>Teorije niske razine</a:t>
-            </a:r>
-            <a:endParaRPr lang="hr-HR" dirty="0">
-              <a:solidFill>
-                <a:srgbClr val="0066CC"/>
-              </a:solidFill>
-              <a:latin typeface="Coda" panose="020B0500000000000004" pitchFamily="34" charset="0"/>
-            </a:endParaRPr>
-          </a:p>
-        </p:txBody>
-      </p:sp>
-      <p:pic>
-        <p:nvPicPr>
-          <p:cNvPr id="9" name="Slika 8"/>
-          <p:cNvPicPr/>
-          <p:nvPr/>
-        </p:nvPicPr>
-        <p:blipFill rotWithShape="1">
-          <a:blip r:embed="rId3"/>
-          <a:srcRect l="40049" t="55208" r="52589" b="39951"/>
-          <a:stretch/>
-        </p:blipFill>
-        <p:spPr bwMode="auto">
-          <a:xfrm>
-            <a:off x="1160740" y="4195405"/>
-            <a:ext cx="2897506" cy="1209468"/>
-          </a:xfrm>
-          <a:prstGeom prst="rect">
-            <a:avLst/>
-          </a:prstGeom>
-          <a:ln>
-            <a:noFill/>
-          </a:ln>
-          <a:extLst>
-            <a:ext uri="{53640926-AAD7-44D8-BBD7-CCE9431645EC}">
-              <a14:shadowObscured xmlns:a14="http://schemas.microsoft.com/office/drawing/2010/main"/>
-            </a:ext>
-          </a:extLst>
         </p:spPr>
       </p:pic>
     </p:spTree>
     <p:extLst>
       <p:ext uri="{BB962C8B-B14F-4D97-AF65-F5344CB8AC3E}">
-        <p14:creationId xmlns:p14="http://schemas.microsoft.com/office/powerpoint/2010/main" val="3642831469"/>
+        <p14:creationId xmlns:p14="http://schemas.microsoft.com/office/powerpoint/2010/main" val="3718436224"/>
       </p:ext>
     </p:extLst>
   </p:cSld>
@@ -9580,6 +9683,165 @@
           <a:chExt cx="0" cy="0"/>
         </a:xfrm>
       </p:grpSpPr>
+      <p:sp>
+        <p:nvSpPr>
+          <p:cNvPr id="4" name="Pravokutnik 3"/>
+          <p:cNvSpPr/>
+          <p:nvPr/>
+        </p:nvSpPr>
+        <p:spPr>
+          <a:xfrm>
+            <a:off x="0" y="0"/>
+            <a:ext cx="12192000" cy="1122363"/>
+          </a:xfrm>
+          <a:prstGeom prst="rect">
+            <a:avLst/>
+          </a:prstGeom>
+          <a:solidFill>
+            <a:srgbClr val="0066CC"/>
+          </a:solidFill>
+        </p:spPr>
+        <p:style>
+          <a:lnRef idx="2">
+            <a:schemeClr val="accent1">
+              <a:shade val="50000"/>
+            </a:schemeClr>
+          </a:lnRef>
+          <a:fillRef idx="1">
+            <a:schemeClr val="accent1"/>
+          </a:fillRef>
+          <a:effectRef idx="0">
+            <a:schemeClr val="accent1"/>
+          </a:effectRef>
+          <a:fontRef idx="minor">
+            <a:schemeClr val="lt1"/>
+          </a:fontRef>
+        </p:style>
+        <p:txBody>
+          <a:bodyPr rtlCol="0" anchor="ctr"/>
+          <a:lstStyle/>
+          <a:p>
+            <a:pPr algn="ctr"/>
+            <a:endParaRPr lang="hr-HR"/>
+          </a:p>
+        </p:txBody>
+      </p:sp>
+      <p:pic>
+        <p:nvPicPr>
+          <p:cNvPr id="5" name="Slika 4"/>
+          <p:cNvPicPr>
+            <a:picLocks noChangeAspect="1"/>
+          </p:cNvPicPr>
+          <p:nvPr/>
+        </p:nvPicPr>
+        <p:blipFill>
+          <a:blip r:embed="rId3">
+            <a:extLst>
+              <a:ext uri="{28A0092B-C50C-407E-A947-70E740481C1C}">
+                <a14:useLocalDpi xmlns:a14="http://schemas.microsoft.com/office/drawing/2010/main" val="0"/>
+              </a:ext>
+            </a:extLst>
+          </a:blip>
+          <a:stretch>
+            <a:fillRect/>
+          </a:stretch>
+        </p:blipFill>
+        <p:spPr>
+          <a:xfrm>
+            <a:off x="331730" y="146676"/>
+            <a:ext cx="829010" cy="829010"/>
+          </a:xfrm>
+          <a:prstGeom prst="rect">
+            <a:avLst/>
+          </a:prstGeom>
+        </p:spPr>
+      </p:pic>
+      <p:sp>
+        <p:nvSpPr>
+          <p:cNvPr id="2" name="Rezervirano mjesto sadržaja 1"/>
+          <p:cNvSpPr>
+            <a:spLocks noGrp="1"/>
+          </p:cNvSpPr>
+          <p:nvPr>
+            <p:ph idx="1"/>
+          </p:nvPr>
+        </p:nvSpPr>
+        <p:spPr/>
+        <p:txBody>
+          <a:bodyPr/>
+          <a:lstStyle/>
+          <a:p>
+            <a:endParaRPr lang="hr-HR" dirty="0"/>
+          </a:p>
+        </p:txBody>
+      </p:sp>
+      <p:pic>
+        <p:nvPicPr>
+          <p:cNvPr id="6" name="Picture 24"/>
+          <p:cNvPicPr/>
+          <p:nvPr/>
+        </p:nvPicPr>
+        <p:blipFill>
+          <a:blip r:embed="rId4"/>
+          <a:stretch>
+            <a:fillRect/>
+          </a:stretch>
+        </p:blipFill>
+        <p:spPr>
+          <a:xfrm>
+            <a:off x="0" y="385011"/>
+            <a:ext cx="12192000" cy="6472989"/>
+          </a:xfrm>
+          <a:prstGeom prst="rect">
+            <a:avLst/>
+          </a:prstGeom>
+        </p:spPr>
+      </p:pic>
+    </p:spTree>
+    <p:extLst>
+      <p:ext uri="{BB962C8B-B14F-4D97-AF65-F5344CB8AC3E}">
+        <p14:creationId xmlns:p14="http://schemas.microsoft.com/office/powerpoint/2010/main" val="1771570508"/>
+      </p:ext>
+    </p:extLst>
+  </p:cSld>
+  <p:clrMapOvr>
+    <a:masterClrMapping/>
+  </p:clrMapOvr>
+  <mc:AlternateContent xmlns:mc="http://schemas.openxmlformats.org/markup-compatibility/2006">
+    <mc:Choice xmlns:p14="http://schemas.microsoft.com/office/powerpoint/2010/main" Requires="p14">
+      <p:transition spd="slow" p14:dur="2000"/>
+    </mc:Choice>
+    <mc:Fallback>
+      <p:transition spd="slow"/>
+    </mc:Fallback>
+  </mc:AlternateContent>
+  <p:timing>
+    <p:tnLst>
+      <p:par>
+        <p:cTn id="1" dur="indefinite" restart="never" nodeType="tmRoot"/>
+      </p:par>
+    </p:tnLst>
+  </p:timing>
+</p:sld>
+</file>
+
+<file path=ppt/slides/slide29.xml><?xml version="1.0" encoding="utf-8"?>
+<p:sld xmlns:a="http://schemas.openxmlformats.org/drawingml/2006/main" xmlns:r="http://schemas.openxmlformats.org/officeDocument/2006/relationships" xmlns:p="http://schemas.openxmlformats.org/presentationml/2006/main">
+  <p:cSld>
+    <p:spTree>
+      <p:nvGrpSpPr>
+        <p:cNvPr id="1" name=""/>
+        <p:cNvGrpSpPr/>
+        <p:nvPr/>
+      </p:nvGrpSpPr>
+      <p:grpSpPr>
+        <a:xfrm>
+          <a:off x="0" y="0"/>
+          <a:ext cx="0" cy="0"/>
+          <a:chOff x="0" y="0"/>
+          <a:chExt cx="0" cy="0"/>
+        </a:xfrm>
+      </p:grpSpPr>
       <p:pic>
         <p:nvPicPr>
           <p:cNvPr id="5" name="Slika 4"/>
@@ -11572,11 +11834,11 @@
   <p:clrMapOvr>
     <a:masterClrMapping/>
   </p:clrMapOvr>
-  <mc:AlternateContent xmlns:mc="http://schemas.openxmlformats.org/markup-compatibility/2006">
-    <mc:Choice xmlns:p14="http://schemas.microsoft.com/office/powerpoint/2010/main" Requires="p14">
+  <mc:AlternateContent xmlns:mc="http://schemas.openxmlformats.org/markup-compatibility/2006" xmlns:p14="http://schemas.microsoft.com/office/powerpoint/2010/main">
+    <mc:Choice Requires="p14">
       <p:transition spd="slow" p14:dur="2000"/>
     </mc:Choice>
-    <mc:Fallback>
+    <mc:Fallback xmlns="">
       <p:transition spd="slow"/>
     </mc:Fallback>
   </mc:AlternateContent>

</xml_diff>